<commit_message>
se realizo todas las preguntas
</commit_message>
<xml_diff>
--- a/2015-2016/clases/computacion_aplicada_2/clase_3/clase_3.pptx
+++ b/2015-2016/clases/computacion_aplicada_2/clase_3/clase_3.pptx
@@ -286,7 +286,7 @@
           <a:p>
             <a:fld id="{D0C39144-A0B6-45B7-AA81-A73EFE064FF5}" type="datetimeFigureOut">
               <a:rPr lang="es-ES" smtClean="0"/>
-              <a:t>23/05/2015</a:t>
+              <a:t>19/06/2015</a:t>
             </a:fld>
             <a:endParaRPr lang="es-ES"/>
           </a:p>
@@ -451,7 +451,7 @@
           <a:p>
             <a:fld id="{D0C39144-A0B6-45B7-AA81-A73EFE064FF5}" type="datetimeFigureOut">
               <a:rPr lang="es-ES" smtClean="0"/>
-              <a:t>23/05/2015</a:t>
+              <a:t>19/06/2015</a:t>
             </a:fld>
             <a:endParaRPr lang="es-ES"/>
           </a:p>
@@ -626,7 +626,7 @@
           <a:p>
             <a:fld id="{D0C39144-A0B6-45B7-AA81-A73EFE064FF5}" type="datetimeFigureOut">
               <a:rPr lang="es-ES" smtClean="0"/>
-              <a:t>23/05/2015</a:t>
+              <a:t>19/06/2015</a:t>
             </a:fld>
             <a:endParaRPr lang="es-ES"/>
           </a:p>
@@ -791,7 +791,7 @@
           <a:p>
             <a:fld id="{D0C39144-A0B6-45B7-AA81-A73EFE064FF5}" type="datetimeFigureOut">
               <a:rPr lang="es-ES" smtClean="0"/>
-              <a:t>23/05/2015</a:t>
+              <a:t>19/06/2015</a:t>
             </a:fld>
             <a:endParaRPr lang="es-ES"/>
           </a:p>
@@ -1033,7 +1033,7 @@
           <a:p>
             <a:fld id="{D0C39144-A0B6-45B7-AA81-A73EFE064FF5}" type="datetimeFigureOut">
               <a:rPr lang="es-ES" smtClean="0"/>
-              <a:t>23/05/2015</a:t>
+              <a:t>19/06/2015</a:t>
             </a:fld>
             <a:endParaRPr lang="es-ES"/>
           </a:p>
@@ -1297,7 +1297,7 @@
           <a:p>
             <a:fld id="{D0C39144-A0B6-45B7-AA81-A73EFE064FF5}" type="datetimeFigureOut">
               <a:rPr lang="es-ES" smtClean="0"/>
-              <a:t>23/05/2015</a:t>
+              <a:t>19/06/2015</a:t>
             </a:fld>
             <a:endParaRPr lang="es-ES"/>
           </a:p>
@@ -1675,7 +1675,7 @@
           <a:p>
             <a:fld id="{D0C39144-A0B6-45B7-AA81-A73EFE064FF5}" type="datetimeFigureOut">
               <a:rPr lang="es-ES" smtClean="0"/>
-              <a:t>23/05/2015</a:t>
+              <a:t>19/06/2015</a:t>
             </a:fld>
             <a:endParaRPr lang="es-ES"/>
           </a:p>
@@ -1825,7 +1825,7 @@
           <a:p>
             <a:fld id="{D0C39144-A0B6-45B7-AA81-A73EFE064FF5}" type="datetimeFigureOut">
               <a:rPr lang="es-ES" smtClean="0"/>
-              <a:t>23/05/2015</a:t>
+              <a:t>19/06/2015</a:t>
             </a:fld>
             <a:endParaRPr lang="es-ES"/>
           </a:p>
@@ -1915,7 +1915,7 @@
           <a:p>
             <a:fld id="{D0C39144-A0B6-45B7-AA81-A73EFE064FF5}" type="datetimeFigureOut">
               <a:rPr lang="es-ES" smtClean="0"/>
-              <a:t>23/05/2015</a:t>
+              <a:t>19/06/2015</a:t>
             </a:fld>
             <a:endParaRPr lang="es-ES"/>
           </a:p>
@@ -2176,7 +2176,7 @@
           <a:p>
             <a:fld id="{D0C39144-A0B6-45B7-AA81-A73EFE064FF5}" type="datetimeFigureOut">
               <a:rPr lang="es-ES" smtClean="0"/>
-              <a:t>23/05/2015</a:t>
+              <a:t>19/06/2015</a:t>
             </a:fld>
             <a:endParaRPr lang="es-ES"/>
           </a:p>
@@ -2464,7 +2464,7 @@
           <a:p>
             <a:fld id="{D0C39144-A0B6-45B7-AA81-A73EFE064FF5}" type="datetimeFigureOut">
               <a:rPr lang="es-ES" smtClean="0"/>
-              <a:t>23/05/2015</a:t>
+              <a:t>19/06/2015</a:t>
             </a:fld>
             <a:endParaRPr lang="es-ES"/>
           </a:p>
@@ -3235,7 +3235,7 @@
           <a:p>
             <a:fld id="{D0C39144-A0B6-45B7-AA81-A73EFE064FF5}" type="datetimeFigureOut">
               <a:rPr lang="es-ES" smtClean="0"/>
-              <a:t>23/05/2015</a:t>
+              <a:t>19/06/2015</a:t>
             </a:fld>
             <a:endParaRPr lang="es-ES"/>
           </a:p>

</xml_diff>